<commit_message>
nueva version capacitacion ate
</commit_message>
<xml_diff>
--- a/contenidos/otros/capacitacion_ate/capacitacion_ate-empleo_publico.pptx
+++ b/contenidos/otros/capacitacion_ate/capacitacion_ate-empleo_publico.pptx
@@ -8,7 +8,7 @@
     <p:notesMasterId r:id="rId42"/>
   </p:notesMasterIdLst>
   <p:sldIdLst>
-    <p:sldId id="300" r:id="rId2"/>
+    <p:sldId id="301" r:id="rId2"/>
     <p:sldId id="256" r:id="rId3"/>
     <p:sldId id="257" r:id="rId4"/>
     <p:sldId id="258" r:id="rId5"/>
@@ -248,7 +248,7 @@
             <a:fld id="{559891D0-ABBA-40AB-9097-95606E82506B}" type="datetimeFigureOut">
               <a:rPr lang="es-AR" smtClean="0"/>
               <a:pPr/>
-              <a:t>23/04/2015</a:t>
+              <a:t>27/04/2015</a:t>
             </a:fld>
             <a:endParaRPr lang="es-AR"/>
           </a:p>
@@ -897,7 +897,7 @@
             <a:fld id="{D6EE4558-0F6E-4407-813E-526489680450}" type="datetimeFigureOut">
               <a:rPr lang="es-AR" smtClean="0"/>
               <a:pPr/>
-              <a:t>23/04/2015</a:t>
+              <a:t>27/04/2015</a:t>
             </a:fld>
             <a:endParaRPr lang="es-AR"/>
           </a:p>
@@ -1064,7 +1064,7 @@
             <a:fld id="{D6EE4558-0F6E-4407-813E-526489680450}" type="datetimeFigureOut">
               <a:rPr lang="es-AR" smtClean="0"/>
               <a:pPr/>
-              <a:t>23/04/2015</a:t>
+              <a:t>27/04/2015</a:t>
             </a:fld>
             <a:endParaRPr lang="es-AR"/>
           </a:p>
@@ -1241,7 +1241,7 @@
             <a:fld id="{D6EE4558-0F6E-4407-813E-526489680450}" type="datetimeFigureOut">
               <a:rPr lang="es-AR" smtClean="0"/>
               <a:pPr/>
-              <a:t>23/04/2015</a:t>
+              <a:t>27/04/2015</a:t>
             </a:fld>
             <a:endParaRPr lang="es-AR"/>
           </a:p>
@@ -1390,7 +1390,7 @@
             <a:fld id="{D6EE4558-0F6E-4407-813E-526489680450}" type="datetimeFigureOut">
               <a:rPr lang="es-AR" smtClean="0"/>
               <a:pPr/>
-              <a:t>23/04/2015</a:t>
+              <a:t>27/04/2015</a:t>
             </a:fld>
             <a:endParaRPr lang="es-AR"/>
           </a:p>
@@ -1509,7 +1509,7 @@
             <a:fld id="{D6EE4558-0F6E-4407-813E-526489680450}" type="datetimeFigureOut">
               <a:rPr lang="es-AR" smtClean="0"/>
               <a:pPr/>
-              <a:t>23/04/2015</a:t>
+              <a:t>27/04/2015</a:t>
             </a:fld>
             <a:endParaRPr lang="es-AR"/>
           </a:p>
@@ -1781,7 +1781,7 @@
             <a:fld id="{D6EE4558-0F6E-4407-813E-526489680450}" type="datetimeFigureOut">
               <a:rPr lang="es-AR" smtClean="0"/>
               <a:pPr/>
-              <a:t>23/04/2015</a:t>
+              <a:t>27/04/2015</a:t>
             </a:fld>
             <a:endParaRPr lang="es-AR"/>
           </a:p>
@@ -2053,7 +2053,7 @@
             <a:fld id="{D6EE4558-0F6E-4407-813E-526489680450}" type="datetimeFigureOut">
               <a:rPr lang="es-AR" smtClean="0"/>
               <a:pPr/>
-              <a:t>23/04/2015</a:t>
+              <a:t>27/04/2015</a:t>
             </a:fld>
             <a:endParaRPr lang="es-AR"/>
           </a:p>
@@ -2501,7 +2501,7 @@
             <a:fld id="{D6EE4558-0F6E-4407-813E-526489680450}" type="datetimeFigureOut">
               <a:rPr lang="es-AR" smtClean="0"/>
               <a:pPr/>
-              <a:t>23/04/2015</a:t>
+              <a:t>27/04/2015</a:t>
             </a:fld>
             <a:endParaRPr lang="es-AR"/>
           </a:p>
@@ -2616,7 +2616,7 @@
             <a:fld id="{D6EE4558-0F6E-4407-813E-526489680450}" type="datetimeFigureOut">
               <a:rPr lang="es-AR" smtClean="0"/>
               <a:pPr/>
-              <a:t>23/04/2015</a:t>
+              <a:t>27/04/2015</a:t>
             </a:fld>
             <a:endParaRPr lang="es-AR"/>
           </a:p>
@@ -2868,7 +2868,7 @@
             <a:fld id="{D6EE4558-0F6E-4407-813E-526489680450}" type="datetimeFigureOut">
               <a:rPr lang="es-AR" smtClean="0"/>
               <a:pPr/>
-              <a:t>23/04/2015</a:t>
+              <a:t>27/04/2015</a:t>
             </a:fld>
             <a:endParaRPr lang="es-AR"/>
           </a:p>
@@ -3110,7 +3110,7 @@
             <a:fld id="{D6EE4558-0F6E-4407-813E-526489680450}" type="datetimeFigureOut">
               <a:rPr lang="es-AR" smtClean="0"/>
               <a:pPr/>
-              <a:t>23/04/2015</a:t>
+              <a:t>27/04/2015</a:t>
             </a:fld>
             <a:endParaRPr lang="es-AR"/>
           </a:p>
@@ -3285,7 +3285,7 @@
             <a:fld id="{D6EE4558-0F6E-4407-813E-526489680450}" type="datetimeFigureOut">
               <a:rPr lang="es-AR" smtClean="0"/>
               <a:pPr/>
-              <a:t>23/04/2015</a:t>
+              <a:t>27/04/2015</a:t>
             </a:fld>
             <a:endParaRPr lang="es-AR"/>
           </a:p>
@@ -3882,7 +3882,7 @@
     </p:spTree>
     <p:extLst>
       <p:ext uri="{BB962C8B-B14F-4D97-AF65-F5344CB8AC3E}">
-        <p14:creationId xmlns:p14="http://schemas.microsoft.com/office/powerpoint/2010/main" val="2799210630"/>
+        <p14:creationId xmlns:p14="http://schemas.microsoft.com/office/powerpoint/2010/main" val="4062184223"/>
       </p:ext>
     </p:extLst>
   </p:cSld>
@@ -8952,8 +8952,8 @@
         </p:blipFill>
         <p:spPr>
           <a:xfrm>
-            <a:off x="395536" y="1772816"/>
-            <a:ext cx="8341280" cy="3516422"/>
+            <a:off x="1142976" y="1928802"/>
+            <a:ext cx="7286676" cy="3071834"/>
           </a:xfrm>
         </p:spPr>
       </p:pic>
@@ -8969,7 +8969,7 @@
         </p:nvSpPr>
         <p:spPr>
           <a:xfrm>
-            <a:off x="1403648" y="5373216"/>
+            <a:off x="1428728" y="5143512"/>
             <a:ext cx="6643734" cy="904868"/>
           </a:xfrm>
         </p:spPr>

</xml_diff>